<commit_message>
supper unltra mega final
</commit_message>
<xml_diff>
--- a/Report/VDQ_TNL_MuaSamTrucTuyen.pptx
+++ b/Report/VDQ_TNL_MuaSamTrucTuyen.pptx
@@ -47016,7 +47016,7 @@
                   <a:ea typeface="Tahoma" panose="020B0604030504040204" pitchFamily="34" charset="0"/>
                   <a:cs typeface="Tahoma" panose="020B0604030504040204" pitchFamily="34" charset="0"/>
                 </a:rPr>
-                <a:t>Bộ dữ liệu mới OrderDF</a:t>
+                <a:t>Bộ dữ liệu mới từ OrderDF</a:t>
               </a:r>
               <a:endParaRPr lang="vi-VN">
                 <a:latin typeface="Tahoma" panose="020B0604030504040204" pitchFamily="34" charset="0"/>
@@ -53162,15 +53162,6 @@
 </file>
 
 <file path=customXml/item1.xml><?xml version="1.0" encoding="utf-8"?>
-<p:properties xmlns:p="http://schemas.microsoft.com/office/2006/metadata/properties" xmlns:xsi="http://www.w3.org/2001/XMLSchema-instance" xmlns:pc="http://schemas.microsoft.com/office/infopath/2007/PartnerControls">
-  <documentManagement>
-    <Status xmlns="71af3243-3dd4-4a8d-8c0d-dd76da1f02a5">Not started</Status>
-    <MediaServiceKeyPoints xmlns="71af3243-3dd4-4a8d-8c0d-dd76da1f02a5" xsi:nil="true"/>
-  </documentManagement>
-</p:properties>
-</file>
-
-<file path=customXml/item2.xml><?xml version="1.0" encoding="utf-8"?>
 <ct:contentTypeSchema xmlns:ct="http://schemas.microsoft.com/office/2006/metadata/contentType" xmlns:ma="http://schemas.microsoft.com/office/2006/metadata/properties/metaAttributes" ct:_="" ma:_="" ma:contentTypeName="Document" ma:contentTypeID="0x01010079F111ED35F8CC479449609E8A0923A6" ma:contentTypeVersion="12" ma:contentTypeDescription="Create a new document." ma:contentTypeScope="" ma:versionID="a410dd7f93c95333ffa1b60ed6adedd1">
   <xsd:schema xmlns:xsd="http://www.w3.org/2001/XMLSchema" xmlns:xs="http://www.w3.org/2001/XMLSchema" xmlns:p="http://schemas.microsoft.com/office/2006/metadata/properties" xmlns:ns2="71af3243-3dd4-4a8d-8c0d-dd76da1f02a5" xmlns:ns3="16c05727-aa75-4e4a-9b5f-8a80a1165891" targetNamespace="http://schemas.microsoft.com/office/2006/metadata/properties" ma:root="true" ma:fieldsID="a936d9baba76aa3866493feff160faab" ns2:_="" ns3:_="">
     <xsd:import namespace="71af3243-3dd4-4a8d-8c0d-dd76da1f02a5"/>
@@ -53391,6 +53382,15 @@
 </ct:contentTypeSchema>
 </file>
 
+<file path=customXml/item2.xml><?xml version="1.0" encoding="utf-8"?>
+<p:properties xmlns:p="http://schemas.microsoft.com/office/2006/metadata/properties" xmlns:xsi="http://www.w3.org/2001/XMLSchema-instance" xmlns:pc="http://schemas.microsoft.com/office/infopath/2007/PartnerControls">
+  <documentManagement>
+    <Status xmlns="71af3243-3dd4-4a8d-8c0d-dd76da1f02a5">Not started</Status>
+    <MediaServiceKeyPoints xmlns="71af3243-3dd4-4a8d-8c0d-dd76da1f02a5" xsi:nil="true"/>
+  </documentManagement>
+</p:properties>
+</file>
+
 <file path=customXml/item3.xml><?xml version="1.0" encoding="utf-8"?>
 <?mso-contentType ?>
 <FormTemplates xmlns="http://schemas.microsoft.com/sharepoint/v3/contenttype/forms">
@@ -53401,16 +53401,6 @@
 </file>
 
 <file path=customXml/itemProps1.xml><?xml version="1.0" encoding="utf-8"?>
-<ds:datastoreItem xmlns:ds="http://schemas.openxmlformats.org/officeDocument/2006/customXml" ds:itemID="{8D289AE2-D2AE-49D1-AFAC-3A79F6794255}">
-  <ds:schemaRefs>
-    <ds:schemaRef ds:uri="http://schemas.microsoft.com/office/2006/metadata/properties"/>
-    <ds:schemaRef ds:uri="http://schemas.microsoft.com/office/infopath/2007/PartnerControls"/>
-    <ds:schemaRef ds:uri="71af3243-3dd4-4a8d-8c0d-dd76da1f02a5"/>
-  </ds:schemaRefs>
-</ds:datastoreItem>
-</file>
-
-<file path=customXml/itemProps2.xml><?xml version="1.0" encoding="utf-8"?>
 <ds:datastoreItem xmlns:ds="http://schemas.openxmlformats.org/officeDocument/2006/customXml" ds:itemID="{41E7CA09-9778-4414-AE97-8064B12DA30E}">
   <ds:schemaRefs>
     <ds:schemaRef ds:uri="http://schemas.microsoft.com/office/2006/metadata/contentType"/>
@@ -53429,6 +53419,16 @@
 </ds:datastoreItem>
 </file>
 
+<file path=customXml/itemProps2.xml><?xml version="1.0" encoding="utf-8"?>
+<ds:datastoreItem xmlns:ds="http://schemas.openxmlformats.org/officeDocument/2006/customXml" ds:itemID="{8D289AE2-D2AE-49D1-AFAC-3A79F6794255}">
+  <ds:schemaRefs>
+    <ds:schemaRef ds:uri="http://schemas.microsoft.com/office/2006/metadata/properties"/>
+    <ds:schemaRef ds:uri="http://schemas.microsoft.com/office/infopath/2007/PartnerControls"/>
+    <ds:schemaRef ds:uri="71af3243-3dd4-4a8d-8c0d-dd76da1f02a5"/>
+  </ds:schemaRefs>
+</ds:datastoreItem>
+</file>
+
 <file path=customXml/itemProps3.xml><?xml version="1.0" encoding="utf-8"?>
 <ds:datastoreItem xmlns:ds="http://schemas.openxmlformats.org/officeDocument/2006/customXml" ds:itemID="{927BD4C1-B6B1-4715-ABF9-E660A51A4EA0}">
   <ds:schemaRefs>

</xml_diff>